<commit_message>
Segundo Fix de Ishikawa
Se arregló el tamaño de fuente para la presentación de caso PPT.
</commit_message>
<xml_diff>
--- a/docs/plan-de-proyecto/presentacion_caso.pptx
+++ b/docs/plan-de-proyecto/presentacion_caso.pptx
@@ -8581,14 +8581,14 @@
               </a:spcAft>
             </a:pPr>
             <a:r>
-              <a:rPr lang="es-ES_tradnl" sz="1200">
+              <a:rPr lang="es-ES_tradnl" sz="1200" dirty="0">
                 <a:effectLst/>
                 <a:ea typeface="Calibri" panose="020F0502020204030204" pitchFamily="34" charset="0"/>
                 <a:cs typeface="Times New Roman" panose="02020603050405020304" pitchFamily="18" charset="0"/>
               </a:rPr>
               <a:t> </a:t>
             </a:r>
-            <a:endParaRPr lang="es-CL" sz="1200">
+            <a:endParaRPr lang="es-CL" sz="1200" dirty="0">
               <a:effectLst/>
               <a:ea typeface="Calibri" panose="020F0502020204030204" pitchFamily="34" charset="0"/>
               <a:cs typeface="Times New Roman" panose="02020603050405020304" pitchFamily="18" charset="0"/>
@@ -8642,14 +8642,14 @@
               </a:spcAft>
             </a:pPr>
             <a:r>
-              <a:rPr lang="es-ES" sz="2400" dirty="0">
+              <a:rPr lang="es-ES" sz="2000" b="1" dirty="0">
                 <a:effectLst/>
                 <a:ea typeface="Calibri" panose="020F0502020204030204" pitchFamily="34" charset="0"/>
                 <a:cs typeface="Times New Roman" panose="02020603050405020304" pitchFamily="18" charset="0"/>
               </a:rPr>
               <a:t>Entorno</a:t>
             </a:r>
-            <a:endParaRPr lang="es-CL" sz="1200" dirty="0">
+            <a:endParaRPr lang="es-CL" sz="1100" b="1" dirty="0">
               <a:effectLst/>
               <a:ea typeface="Calibri" panose="020F0502020204030204" pitchFamily="34" charset="0"/>
               <a:cs typeface="Times New Roman" panose="02020603050405020304" pitchFamily="18" charset="0"/>
@@ -8703,13 +8703,13 @@
               </a:spcAft>
             </a:pPr>
             <a:r>
-              <a:rPr lang="es-CL" dirty="0">
+              <a:rPr lang="es-CL" sz="2000" b="1" dirty="0">
                 <a:ea typeface="Calibri" panose="020F0502020204030204" pitchFamily="34" charset="0"/>
                 <a:cs typeface="Times New Roman" panose="02020603050405020304" pitchFamily="18" charset="0"/>
               </a:rPr>
               <a:t>Procesos toman demasiado tiempo</a:t>
             </a:r>
-            <a:endParaRPr lang="es-CL" dirty="0">
+            <a:endParaRPr lang="es-CL" sz="2000" b="1" dirty="0">
               <a:effectLst/>
               <a:ea typeface="Calibri" panose="020F0502020204030204" pitchFamily="34" charset="0"/>
               <a:cs typeface="Times New Roman" panose="02020603050405020304" pitchFamily="18" charset="0"/>
@@ -8725,8 +8725,8 @@
         </p:nvCxnSpPr>
         <p:spPr>
           <a:xfrm>
-            <a:off x="3677412" y="3710544"/>
-            <a:ext cx="4670442" cy="11632"/>
+            <a:off x="3784091" y="3714628"/>
+            <a:ext cx="4659322" cy="22869"/>
           </a:xfrm>
           <a:prstGeom prst="line">
             <a:avLst/>
@@ -8850,8 +8850,8 @@
         </p:nvCxnSpPr>
         <p:spPr>
           <a:xfrm flipV="1">
-            <a:off x="5727386" y="3731680"/>
-            <a:ext cx="1174952" cy="1634553"/>
+            <a:off x="5501408" y="3731681"/>
+            <a:ext cx="1400930" cy="1634552"/>
           </a:xfrm>
           <a:prstGeom prst="line">
             <a:avLst/>
@@ -8919,7 +8919,7 @@
               </a:spcAft>
             </a:pPr>
             <a:r>
-              <a:rPr lang="es-ES" b="1" dirty="0">
+              <a:rPr lang="es-ES" sz="1600" b="1" dirty="0">
                 <a:solidFill>
                   <a:schemeClr val="tx1"/>
                 </a:solidFill>
@@ -8929,7 +8929,7 @@
               </a:rPr>
               <a:t>Alto volumen de pacientes</a:t>
             </a:r>
-            <a:endParaRPr lang="es-CL" sz="3200" b="1" dirty="0">
+            <a:endParaRPr lang="es-CL" sz="2800" b="1" dirty="0">
               <a:solidFill>
                 <a:schemeClr val="tx1"/>
               </a:solidFill>
@@ -9039,8 +9039,8 @@
         </p:nvSpPr>
         <p:spPr>
           <a:xfrm>
-            <a:off x="3778287" y="4561764"/>
-            <a:ext cx="1776091" cy="677747"/>
+            <a:off x="3518015" y="4561764"/>
+            <a:ext cx="2036364" cy="677747"/>
           </a:xfrm>
           <a:prstGeom prst="rect">
             <a:avLst/>
@@ -9077,22 +9077,29 @@
               </a:spcAft>
             </a:pPr>
             <a:r>
-              <a:rPr lang="es-ES" sz="1400" b="1" dirty="0" smtClean="0">
+              <a:rPr lang="es-ES" sz="1600" b="1" dirty="0">
+                <a:ea typeface="Calibri" panose="020F0502020204030204" pitchFamily="34" charset="0"/>
+                <a:cs typeface="Times New Roman" panose="02020603050405020304" pitchFamily="18" charset="0"/>
+              </a:rPr>
+              <a:t>A</a:t>
+            </a:r>
+            <a:r>
+              <a:rPr lang="es-ES" sz="1600" b="1" dirty="0" smtClean="0">
                 <a:effectLst/>
                 <a:ea typeface="Calibri" panose="020F0502020204030204" pitchFamily="34" charset="0"/>
                 <a:cs typeface="Times New Roman" panose="02020603050405020304" pitchFamily="18" charset="0"/>
               </a:rPr>
-              <a:t>almacenamiento </a:t>
-            </a:r>
-            <a:r>
-              <a:rPr lang="es-ES" sz="1400" b="1" dirty="0">
+              <a:t>lmacenamiento </a:t>
+            </a:r>
+            <a:r>
+              <a:rPr lang="es-ES" sz="1600" b="1" dirty="0">
                 <a:effectLst/>
                 <a:ea typeface="Calibri" panose="020F0502020204030204" pitchFamily="34" charset="0"/>
                 <a:cs typeface="Times New Roman" panose="02020603050405020304" pitchFamily="18" charset="0"/>
               </a:rPr>
               <a:t>desorganizado </a:t>
             </a:r>
-            <a:endParaRPr lang="es-ES" sz="2400" b="1" dirty="0">
+            <a:endParaRPr lang="es-ES" sz="2800" b="1" dirty="0">
               <a:effectLst/>
               <a:ea typeface="Calibri" panose="020F0502020204030204" pitchFamily="34" charset="0"/>
               <a:cs typeface="Times New Roman" panose="02020603050405020304" pitchFamily="18" charset="0"/>
@@ -9235,7 +9242,7 @@
         <p:spPr>
           <a:xfrm>
             <a:off x="5558398" y="4876435"/>
-            <a:ext cx="528954" cy="0"/>
+            <a:ext cx="281963" cy="24202"/>
           </a:xfrm>
           <a:prstGeom prst="line">
             <a:avLst/>
@@ -9294,8 +9301,8 @@
         </p:nvSpPr>
         <p:spPr>
           <a:xfrm>
-            <a:off x="2008054" y="1897530"/>
-            <a:ext cx="1862356" cy="535055"/>
+            <a:off x="1639488" y="1897530"/>
+            <a:ext cx="2449920" cy="535055"/>
           </a:xfrm>
           <a:prstGeom prst="roundRect">
             <a:avLst/>
@@ -9332,14 +9339,14 @@
               </a:spcAft>
             </a:pPr>
             <a:r>
-              <a:rPr lang="es-ES" dirty="0">
+              <a:rPr lang="es-ES" sz="2000" b="1" dirty="0">
                 <a:effectLst/>
                 <a:ea typeface="Calibri" panose="020F0502020204030204" pitchFamily="34" charset="0"/>
                 <a:cs typeface="Times New Roman" panose="02020603050405020304" pitchFamily="18" charset="0"/>
               </a:rPr>
               <a:t>Procedimientos</a:t>
             </a:r>
-            <a:endParaRPr lang="es-CL" sz="1200" dirty="0">
+            <a:endParaRPr lang="es-CL" sz="1400" b="1" dirty="0">
               <a:effectLst/>
               <a:ea typeface="Calibri" panose="020F0502020204030204" pitchFamily="34" charset="0"/>
               <a:cs typeface="Times New Roman" panose="02020603050405020304" pitchFamily="18" charset="0"/>
@@ -9355,8 +9362,8 @@
         </p:nvSpPr>
         <p:spPr>
           <a:xfrm>
-            <a:off x="5260466" y="1903078"/>
-            <a:ext cx="1687760" cy="535055"/>
+            <a:off x="5058697" y="1903078"/>
+            <a:ext cx="1889529" cy="535055"/>
           </a:xfrm>
           <a:prstGeom prst="roundRect">
             <a:avLst/>
@@ -9393,14 +9400,14 @@
               </a:spcAft>
             </a:pPr>
             <a:r>
-              <a:rPr lang="es-ES" sz="2000" dirty="0">
+              <a:rPr lang="es-ES" sz="2000" b="1" dirty="0">
                 <a:effectLst/>
                 <a:ea typeface="Calibri" panose="020F0502020204030204" pitchFamily="34" charset="0"/>
                 <a:cs typeface="Times New Roman" panose="02020603050405020304" pitchFamily="18" charset="0"/>
               </a:rPr>
               <a:t>Información</a:t>
             </a:r>
-            <a:endParaRPr lang="es-CL" sz="1200" dirty="0">
+            <a:endParaRPr lang="es-CL" sz="1200" b="1" dirty="0">
               <a:effectLst/>
               <a:ea typeface="Calibri" panose="020F0502020204030204" pitchFamily="34" charset="0"/>
               <a:cs typeface="Times New Roman" panose="02020603050405020304" pitchFamily="18" charset="0"/>
@@ -9454,14 +9461,14 @@
               </a:spcAft>
             </a:pPr>
             <a:r>
-              <a:rPr lang="es-ES" b="1" dirty="0">
+              <a:rPr lang="es-ES" sz="1600" b="1" dirty="0">
                 <a:effectLst/>
                 <a:ea typeface="Calibri" panose="020F0502020204030204" pitchFamily="34" charset="0"/>
                 <a:cs typeface="Times New Roman" panose="02020603050405020304" pitchFamily="18" charset="0"/>
               </a:rPr>
               <a:t>Poca claridad</a:t>
             </a:r>
-            <a:endParaRPr lang="es-ES" sz="3200" b="1" dirty="0">
+            <a:endParaRPr lang="es-ES" sz="2800" b="1" dirty="0">
               <a:effectLst/>
               <a:ea typeface="Calibri" panose="020F0502020204030204" pitchFamily="34" charset="0"/>
               <a:cs typeface="Times New Roman" panose="02020603050405020304" pitchFamily="18" charset="0"/>
@@ -9583,7 +9590,7 @@
               </a:spcAft>
             </a:pPr>
             <a:r>
-              <a:rPr lang="es-ES" sz="1400" b="1" dirty="0">
+              <a:rPr lang="es-ES" sz="1600" b="1" dirty="0">
                 <a:effectLst/>
                 <a:ea typeface="Calibri" panose="020F0502020204030204" pitchFamily="34" charset="0"/>
                 <a:cs typeface="Times New Roman" panose="02020603050405020304" pitchFamily="18" charset="0"/>
@@ -9601,8 +9608,8 @@
         </p:nvSpPr>
         <p:spPr>
           <a:xfrm>
-            <a:off x="4861681" y="5366233"/>
-            <a:ext cx="1731409" cy="535055"/>
+            <a:off x="4409725" y="5366233"/>
+            <a:ext cx="2183365" cy="535055"/>
           </a:xfrm>
           <a:prstGeom prst="roundRect">
             <a:avLst/>
@@ -9639,14 +9646,14 @@
               </a:spcAft>
             </a:pPr>
             <a:r>
-              <a:rPr lang="es-ES" dirty="0">
+              <a:rPr lang="es-ES" sz="2000" b="1" dirty="0">
                 <a:effectLst/>
                 <a:ea typeface="Calibri" panose="020F0502020204030204" pitchFamily="34" charset="0"/>
                 <a:cs typeface="Times New Roman" panose="02020603050405020304" pitchFamily="18" charset="0"/>
               </a:rPr>
               <a:t>Herramientas</a:t>
             </a:r>
-            <a:endParaRPr lang="es-CL" sz="1200" dirty="0">
+            <a:endParaRPr lang="es-CL" sz="1400" b="1" dirty="0">
               <a:effectLst/>
               <a:ea typeface="Calibri" panose="020F0502020204030204" pitchFamily="34" charset="0"/>
               <a:cs typeface="Times New Roman" panose="02020603050405020304" pitchFamily="18" charset="0"/>
@@ -9713,7 +9720,7 @@
               </a:spcAft>
             </a:pPr>
             <a:r>
-              <a:rPr lang="es-ES" sz="2000" dirty="0">
+              <a:rPr lang="es-ES" sz="1600" b="1" dirty="0">
                 <a:solidFill>
                   <a:schemeClr val="tx1"/>
                 </a:solidFill>
@@ -9723,7 +9730,7 @@
               </a:rPr>
               <a:t>Datos en papel</a:t>
             </a:r>
-            <a:endParaRPr lang="es-CL" sz="3600" dirty="0">
+            <a:endParaRPr lang="es-CL" sz="1600" b="1" dirty="0">
               <a:solidFill>
                 <a:schemeClr val="tx1"/>
               </a:solidFill>

</xml_diff>